<commit_message>
Updated my Code PaLOUsa presentation.
</commit_message>
<xml_diff>
--- a/Presenations/Intro to Accessible Web Design_2021.pptx
+++ b/Presenations/Intro to Accessible Web Design_2021.pptx
@@ -1100,12 +1100,12 @@
   <pc:docChgLst>
     <pc:chgData name="Elizabeth Gray" userId="2112a60c0cddb7a4" providerId="LiveId" clId="{2704D1C1-7A4C-43B9-8791-2614C5C1E643}"/>
     <pc:docChg chg="undo redo custSel addSld delSld modSld sldOrd">
-      <pc:chgData name="Elizabeth Gray" userId="2112a60c0cddb7a4" providerId="LiveId" clId="{2704D1C1-7A4C-43B9-8791-2614C5C1E643}" dt="2021-08-20T01:41:25.159" v="1505" actId="20577"/>
+      <pc:chgData name="Elizabeth Gray" userId="2112a60c0cddb7a4" providerId="LiveId" clId="{2704D1C1-7A4C-43B9-8791-2614C5C1E643}" dt="2021-08-20T02:42:26.699" v="1512" actId="478"/>
       <pc:docMkLst>
         <pc:docMk/>
       </pc:docMkLst>
       <pc:sldChg chg="addSp delSp modSp mod">
-        <pc:chgData name="Elizabeth Gray" userId="2112a60c0cddb7a4" providerId="LiveId" clId="{2704D1C1-7A4C-43B9-8791-2614C5C1E643}" dt="2021-08-19T00:16:49.185" v="7"/>
+        <pc:chgData name="Elizabeth Gray" userId="2112a60c0cddb7a4" providerId="LiveId" clId="{2704D1C1-7A4C-43B9-8791-2614C5C1E643}" dt="2021-08-20T02:41:10.510" v="1506" actId="478"/>
         <pc:sldMkLst>
           <pc:docMk/>
           <pc:sldMk cId="3165525781" sldId="256"/>
@@ -1124,6 +1124,14 @@
             <pc:docMk/>
             <pc:sldMk cId="3165525781" sldId="256"/>
             <ac:spMk id="3" creationId="{045EE49E-75FC-42A8-BD0E-5D32CA76F003}"/>
+          </ac:spMkLst>
+        </pc:spChg>
+        <pc:spChg chg="del">
+          <ac:chgData name="Elizabeth Gray" userId="2112a60c0cddb7a4" providerId="LiveId" clId="{2704D1C1-7A4C-43B9-8791-2614C5C1E643}" dt="2021-08-20T02:41:10.510" v="1506" actId="478"/>
+          <ac:spMkLst>
+            <pc:docMk/>
+            <pc:sldMk cId="3165525781" sldId="256"/>
+            <ac:spMk id="4" creationId="{995352AF-C6CC-496E-9B20-40A29A879955}"/>
           </ac:spMkLst>
         </pc:spChg>
         <pc:spChg chg="add del mod">
@@ -1219,7 +1227,7 @@
         </pc:spChg>
       </pc:sldChg>
       <pc:sldChg chg="addSp delSp modSp mod ord">
-        <pc:chgData name="Elizabeth Gray" userId="2112a60c0cddb7a4" providerId="LiveId" clId="{2704D1C1-7A4C-43B9-8791-2614C5C1E643}" dt="2021-08-19T00:27:31.152" v="292"/>
+        <pc:chgData name="Elizabeth Gray" userId="2112a60c0cddb7a4" providerId="LiveId" clId="{2704D1C1-7A4C-43B9-8791-2614C5C1E643}" dt="2021-08-20T02:42:26.699" v="1512" actId="478"/>
         <pc:sldMkLst>
           <pc:docMk/>
           <pc:sldMk cId="3587248292" sldId="264"/>
@@ -1249,11 +1257,19 @@
           </ac:spMkLst>
         </pc:spChg>
         <pc:spChg chg="add del">
-          <ac:chgData name="Elizabeth Gray" userId="2112a60c0cddb7a4" providerId="LiveId" clId="{2704D1C1-7A4C-43B9-8791-2614C5C1E643}" dt="2021-08-19T00:22:12.317" v="233" actId="478"/>
+          <ac:chgData name="Elizabeth Gray" userId="2112a60c0cddb7a4" providerId="LiveId" clId="{2704D1C1-7A4C-43B9-8791-2614C5C1E643}" dt="2021-08-20T02:42:19.496" v="1511" actId="478"/>
           <ac:spMkLst>
             <pc:docMk/>
             <pc:sldMk cId="3587248292" sldId="264"/>
             <ac:spMk id="29" creationId="{60B26874-5AFA-4D1E-94A9-53AF9790D702}"/>
+          </ac:spMkLst>
+        </pc:spChg>
+        <pc:spChg chg="add del mod modVis">
+          <ac:chgData name="Elizabeth Gray" userId="2112a60c0cddb7a4" providerId="LiveId" clId="{2704D1C1-7A4C-43B9-8791-2614C5C1E643}" dt="2021-08-20T02:42:26.699" v="1512" actId="478"/>
+          <ac:spMkLst>
+            <pc:docMk/>
+            <pc:sldMk cId="3587248292" sldId="264"/>
+            <ac:spMk id="34" creationId="{CC28BCC9-4093-4FD5-83EB-7EC297F51396}"/>
           </ac:spMkLst>
         </pc:spChg>
         <pc:picChg chg="mod">
@@ -18095,7 +18111,7 @@
           <a:p>
             <a:fld id="{6BEA0962-65BB-41FC-8F83-27AD2119E7B1}" type="datetimeFigureOut">
               <a:rPr lang="en-US" smtClean="0"/>
-              <a:t>8/18/2021</a:t>
+              <a:t>8/19/2021</a:t>
             </a:fld>
             <a:endParaRPr lang="en-US"/>
           </a:p>
@@ -21103,7 +21119,7 @@
           <a:p>
             <a:fld id="{F766529D-BA39-40F6-82A5-7A10987C8459}" type="datetimeFigureOut">
               <a:rPr lang="en-US" smtClean="0"/>
-              <a:t>8/18/2021</a:t>
+              <a:t>8/19/2021</a:t>
             </a:fld>
             <a:endParaRPr lang="en-US"/>
           </a:p>
@@ -22189,7 +22205,7 @@
           <a:p>
             <a:fld id="{F766529D-BA39-40F6-82A5-7A10987C8459}" type="datetimeFigureOut">
               <a:rPr lang="en-US" smtClean="0"/>
-              <a:t>8/18/2021</a:t>
+              <a:t>8/19/2021</a:t>
             </a:fld>
             <a:endParaRPr lang="en-US"/>
           </a:p>
@@ -23168,7 +23184,7 @@
           <a:p>
             <a:fld id="{F766529D-BA39-40F6-82A5-7A10987C8459}" type="datetimeFigureOut">
               <a:rPr lang="en-US" smtClean="0"/>
-              <a:t>8/18/2021</a:t>
+              <a:t>8/19/2021</a:t>
             </a:fld>
             <a:endParaRPr lang="en-US"/>
           </a:p>
@@ -24301,7 +24317,7 @@
           <a:p>
             <a:fld id="{F766529D-BA39-40F6-82A5-7A10987C8459}" type="datetimeFigureOut">
               <a:rPr lang="en-US" smtClean="0"/>
-              <a:t>8/18/2021</a:t>
+              <a:t>8/19/2021</a:t>
             </a:fld>
             <a:endParaRPr lang="en-US"/>
           </a:p>
@@ -25333,7 +25349,7 @@
           <a:p>
             <a:fld id="{F766529D-BA39-40F6-82A5-7A10987C8459}" type="datetimeFigureOut">
               <a:rPr lang="en-US" smtClean="0"/>
-              <a:t>8/18/2021</a:t>
+              <a:t>8/19/2021</a:t>
             </a:fld>
             <a:endParaRPr lang="en-US"/>
           </a:p>
@@ -25992,7 +26008,7 @@
           <a:p>
             <a:fld id="{F766529D-BA39-40F6-82A5-7A10987C8459}" type="datetimeFigureOut">
               <a:rPr lang="en-US" smtClean="0"/>
-              <a:t>8/18/2021</a:t>
+              <a:t>8/19/2021</a:t>
             </a:fld>
             <a:endParaRPr lang="en-US"/>
           </a:p>
@@ -26849,7 +26865,7 @@
           <a:p>
             <a:fld id="{F766529D-BA39-40F6-82A5-7A10987C8459}" type="datetimeFigureOut">
               <a:rPr lang="en-US" smtClean="0"/>
-              <a:t>8/18/2021</a:t>
+              <a:t>8/19/2021</a:t>
             </a:fld>
             <a:endParaRPr lang="en-US"/>
           </a:p>
@@ -27037,7 +27053,7 @@
           <a:p>
             <a:fld id="{F766529D-BA39-40F6-82A5-7A10987C8459}" type="datetimeFigureOut">
               <a:rPr lang="en-US" smtClean="0"/>
-              <a:t>8/18/2021</a:t>
+              <a:t>8/19/2021</a:t>
             </a:fld>
             <a:endParaRPr lang="en-US"/>
           </a:p>
@@ -28007,7 +28023,7 @@
           <a:p>
             <a:fld id="{F766529D-BA39-40F6-82A5-7A10987C8459}" type="datetimeFigureOut">
               <a:rPr lang="en-US" smtClean="0"/>
-              <a:t>8/18/2021</a:t>
+              <a:t>8/19/2021</a:t>
             </a:fld>
             <a:endParaRPr lang="en-US"/>
           </a:p>
@@ -28216,7 +28232,7 @@
           <a:p>
             <a:fld id="{F766529D-BA39-40F6-82A5-7A10987C8459}" type="datetimeFigureOut">
               <a:rPr lang="en-US" smtClean="0"/>
-              <a:t>8/18/2021</a:t>
+              <a:t>8/19/2021</a:t>
             </a:fld>
             <a:endParaRPr lang="en-US"/>
           </a:p>
@@ -29249,7 +29265,7 @@
           <a:p>
             <a:fld id="{F766529D-BA39-40F6-82A5-7A10987C8459}" type="datetimeFigureOut">
               <a:rPr lang="en-US" smtClean="0"/>
-              <a:t>8/18/2021</a:t>
+              <a:t>8/19/2021</a:t>
             </a:fld>
             <a:endParaRPr lang="en-US"/>
           </a:p>
@@ -29518,7 +29534,7 @@
           <a:p>
             <a:fld id="{F766529D-BA39-40F6-82A5-7A10987C8459}" type="datetimeFigureOut">
               <a:rPr lang="en-US" smtClean="0"/>
-              <a:t>8/18/2021</a:t>
+              <a:t>8/19/2021</a:t>
             </a:fld>
             <a:endParaRPr lang="en-US"/>
           </a:p>
@@ -29925,7 +29941,7 @@
           <a:p>
             <a:fld id="{F766529D-BA39-40F6-82A5-7A10987C8459}" type="datetimeFigureOut">
               <a:rPr lang="en-US" smtClean="0"/>
-              <a:t>8/18/2021</a:t>
+              <a:t>8/19/2021</a:t>
             </a:fld>
             <a:endParaRPr lang="en-US"/>
           </a:p>
@@ -30051,7 +30067,7 @@
           <a:p>
             <a:fld id="{F766529D-BA39-40F6-82A5-7A10987C8459}" type="datetimeFigureOut">
               <a:rPr lang="en-US" smtClean="0"/>
-              <a:t>8/18/2021</a:t>
+              <a:t>8/19/2021</a:t>
             </a:fld>
             <a:endParaRPr lang="en-US"/>
           </a:p>
@@ -30146,7 +30162,7 @@
           <a:p>
             <a:fld id="{F766529D-BA39-40F6-82A5-7A10987C8459}" type="datetimeFigureOut">
               <a:rPr lang="en-US" smtClean="0"/>
-              <a:t>8/18/2021</a:t>
+              <a:t>8/19/2021</a:t>
             </a:fld>
             <a:endParaRPr lang="en-US"/>
           </a:p>
@@ -31225,7 +31241,7 @@
           <a:p>
             <a:fld id="{F766529D-BA39-40F6-82A5-7A10987C8459}" type="datetimeFigureOut">
               <a:rPr lang="en-US" smtClean="0"/>
-              <a:t>8/18/2021</a:t>
+              <a:t>8/19/2021</a:t>
             </a:fld>
             <a:endParaRPr lang="en-US"/>
           </a:p>
@@ -32331,7 +32347,7 @@
           <a:p>
             <a:fld id="{F766529D-BA39-40F6-82A5-7A10987C8459}" type="datetimeFigureOut">
               <a:rPr lang="en-US" smtClean="0"/>
-              <a:t>8/18/2021</a:t>
+              <a:t>8/19/2021</a:t>
             </a:fld>
             <a:endParaRPr lang="en-US"/>
           </a:p>
@@ -33326,7 +33342,7 @@
           <a:p>
             <a:fld id="{F766529D-BA39-40F6-82A5-7A10987C8459}" type="datetimeFigureOut">
               <a:rPr lang="en-US" smtClean="0"/>
-              <a:t>8/18/2021</a:t>
+              <a:t>8/19/2021</a:t>
             </a:fld>
             <a:endParaRPr lang="en-US"/>
           </a:p>
@@ -33885,46 +33901,6 @@
           <a:chExt cx="0" cy="0"/>
         </a:xfrm>
       </p:grpSpPr>
-      <p:sp>
-        <p:nvSpPr>
-          <p:cNvPr id="4" name="TextBox 3">
-            <a:extLst>
-              <a:ext uri="{FF2B5EF4-FFF2-40B4-BE49-F238E27FC236}">
-                <a16:creationId xmlns:a16="http://schemas.microsoft.com/office/drawing/2014/main" id="{995352AF-C6CC-496E-9B20-40A29A879955}"/>
-              </a:ext>
-            </a:extLst>
-          </p:cNvPr>
-          <p:cNvSpPr txBox="1"/>
-          <p:nvPr/>
-        </p:nvSpPr>
-        <p:spPr>
-          <a:xfrm>
-            <a:off x="7213600" y="5988756"/>
-            <a:ext cx="4413955" cy="369332"/>
-          </a:xfrm>
-          <a:prstGeom prst="rect">
-            <a:avLst/>
-          </a:prstGeom>
-          <a:noFill/>
-        </p:spPr>
-        <p:txBody>
-          <a:bodyPr wrap="square" rtlCol="0">
-            <a:spAutoFit/>
-          </a:bodyPr>
-          <a:lstStyle/>
-          <a:p>
-            <a:pPr algn="r"/>
-            <a:r>
-              <a:rPr lang="en-US" dirty="0">
-                <a:solidFill>
-                  <a:schemeClr val="bg1"/>
-                </a:solidFill>
-              </a:rPr>
-              <a:t>Beth Gray</a:t>
-            </a:r>
-          </a:p>
-        </p:txBody>
-      </p:sp>
       <p:sp>
         <p:nvSpPr>
           <p:cNvPr id="2" name="Title 1">

</xml_diff>